<commit_message>
sprint 6 a entregar y avances en sprint 7
</commit_message>
<xml_diff>
--- a/Sprint 6 - Visualitzacions i Informes amb Power BI/T6 - N3E1 - User 96.pptx
+++ b/Sprint 6 - Visualitzacions i Informes amb Power BI/T6 - N3E1 - User 96.pptx
@@ -224,7 +224,7 @@
               <a:rPr lang="es-ES" smtClean="0">
                 <a:latin typeface="Tw Cen MT" panose="020B0602020104020603" pitchFamily="34" charset="0"/>
               </a:rPr>
-              <a:t>12/02/2025</a:t>
+              <a:t>13/02/2025</a:t>
             </a:fld>
             <a:endParaRPr lang="es-ES">
               <a:latin typeface="Tw Cen MT" panose="020B0602020104020603" pitchFamily="34" charset="0"/>
@@ -418,7 +418,7 @@
             <a:pPr rtl="0"/>
             <a:fld id="{AD7E05D5-5313-4A58-ADF1-723C0AC32D87}" type="datetime1">
               <a:rPr lang="es-ES" noProof="0" smtClean="0"/>
-              <a:t>12/02/2025</a:t>
+              <a:t>13/02/2025</a:t>
             </a:fld>
             <a:endParaRPr lang="es-ES" noProof="0"/>
           </a:p>
@@ -30834,12 +30834,9 @@
           <a:p>
             <a:pPr rtl="0"/>
             <a:r>
-              <a:rPr lang="en-GB" noProof="1"/>
-              <a:t>Personal &amp; purchases information</a:t>
-            </a:r>
-          </a:p>
-          <a:p>
-            <a:pPr rtl="0"/>
+              <a:rPr lang="en-US" noProof="1"/>
+              <a:t>User's personal information and transactions</a:t>
+            </a:r>
             <a:endParaRPr lang="en-GB" noProof="1"/>
           </a:p>
         </p:txBody>
@@ -30981,7 +30978,7 @@
         </p:nvSpPr>
         <p:spPr>
           <a:xfrm>
-            <a:off x="541021" y="5688559"/>
+            <a:off x="573976" y="5678051"/>
             <a:ext cx="3108959" cy="812521"/>
           </a:xfrm>
         </p:spPr>
@@ -31335,8 +31332,8 @@
         </p:blipFill>
         <p:spPr>
           <a:xfrm>
-            <a:off x="3857147" y="1902070"/>
-            <a:ext cx="8226154" cy="4599010"/>
+            <a:off x="3747253" y="1772816"/>
+            <a:ext cx="7967243" cy="4454260"/>
           </a:xfrm>
           <a:prstGeom prst="rect">
             <a:avLst/>
@@ -31371,8 +31368,8 @@
         </p:blipFill>
         <p:spPr>
           <a:xfrm>
-            <a:off x="931069" y="5286591"/>
-            <a:ext cx="365760" cy="365760"/>
+            <a:off x="885206" y="5653299"/>
+            <a:ext cx="325535" cy="325535"/>
           </a:xfrm>
           <a:prstGeom prst="rect">
             <a:avLst/>
@@ -31407,8 +31404,8 @@
         </p:blipFill>
         <p:spPr>
           <a:xfrm>
-            <a:off x="1004039" y="5971687"/>
-            <a:ext cx="173992" cy="173992"/>
+            <a:off x="911424" y="5897743"/>
+            <a:ext cx="267561" cy="267561"/>
           </a:xfrm>
           <a:prstGeom prst="rect">
             <a:avLst/>
@@ -31443,8 +31440,8 @@
         </p:blipFill>
         <p:spPr>
           <a:xfrm>
-            <a:off x="1004039" y="6152800"/>
-            <a:ext cx="156336" cy="156336"/>
+            <a:off x="911424" y="6093296"/>
+            <a:ext cx="267560" cy="267560"/>
           </a:xfrm>
           <a:prstGeom prst="rect">
             <a:avLst/>
@@ -32008,6 +32005,102 @@
           </a:prstGeom>
         </p:spPr>
       </p:pic>
+      <p:sp>
+        <p:nvSpPr>
+          <p:cNvPr id="2" name="TextBox 1">
+            <a:extLst>
+              <a:ext uri="{FF2B5EF4-FFF2-40B4-BE49-F238E27FC236}">
+                <a16:creationId xmlns:a16="http://schemas.microsoft.com/office/drawing/2014/main" id="{DA2F58F7-B445-A9C3-57EA-8523A91A637C}"/>
+              </a:ext>
+            </a:extLst>
+          </p:cNvPr>
+          <p:cNvSpPr txBox="1"/>
+          <p:nvPr/>
+        </p:nvSpPr>
+        <p:spPr>
+          <a:xfrm>
+            <a:off x="1586828" y="3212976"/>
+            <a:ext cx="6552728" cy="369332"/>
+          </a:xfrm>
+          <a:prstGeom prst="rect">
+            <a:avLst/>
+          </a:prstGeom>
+          <a:noFill/>
+        </p:spPr>
+        <p:txBody>
+          <a:bodyPr wrap="square" rtlCol="0">
+            <a:spAutoFit/>
+          </a:bodyPr>
+          <a:lstStyle/>
+          <a:p>
+            <a:pPr marL="285750" indent="-285750">
+              <a:buFont typeface="Wingdings" panose="05000000000000000000" pitchFamily="2" charset="2"/>
+              <a:buChar char="Ø"/>
+            </a:pPr>
+            <a:r>
+              <a:rPr lang="en-US" dirty="0">
+                <a:solidFill>
+                  <a:schemeClr val="accent1"/>
+                </a:solidFill>
+              </a:rPr>
+              <a:t>22 purchases accepted with a total value of 5,348.56 €</a:t>
+            </a:r>
+            <a:endParaRPr lang="en-GB" dirty="0">
+              <a:solidFill>
+                <a:schemeClr val="accent1"/>
+              </a:solidFill>
+            </a:endParaRPr>
+          </a:p>
+        </p:txBody>
+      </p:sp>
+      <p:sp>
+        <p:nvSpPr>
+          <p:cNvPr id="9" name="TextBox 8">
+            <a:extLst>
+              <a:ext uri="{FF2B5EF4-FFF2-40B4-BE49-F238E27FC236}">
+                <a16:creationId xmlns:a16="http://schemas.microsoft.com/office/drawing/2014/main" id="{FA852CF4-492B-B8F7-7F44-4EB0BFEBACAF}"/>
+              </a:ext>
+            </a:extLst>
+          </p:cNvPr>
+          <p:cNvSpPr txBox="1"/>
+          <p:nvPr/>
+        </p:nvSpPr>
+        <p:spPr>
+          <a:xfrm>
+            <a:off x="1586828" y="5373216"/>
+            <a:ext cx="6111240" cy="369332"/>
+          </a:xfrm>
+          <a:prstGeom prst="rect">
+            <a:avLst/>
+          </a:prstGeom>
+          <a:noFill/>
+        </p:spPr>
+        <p:txBody>
+          <a:bodyPr wrap="square">
+            <a:spAutoFit/>
+          </a:bodyPr>
+          <a:lstStyle/>
+          <a:p>
+            <a:pPr marL="285750" indent="-285750">
+              <a:buFont typeface="Wingdings" panose="05000000000000000000" pitchFamily="2" charset="2"/>
+              <a:buChar char="Ø"/>
+            </a:pPr>
+            <a:r>
+              <a:rPr lang="en-US" dirty="0">
+                <a:solidFill>
+                  <a:schemeClr val="accent1"/>
+                </a:solidFill>
+              </a:rPr>
+              <a:t>3 purchases accepted with a total value of 259.07 €</a:t>
+            </a:r>
+            <a:endParaRPr lang="en-GB" dirty="0">
+              <a:solidFill>
+                <a:schemeClr val="accent1"/>
+              </a:solidFill>
+            </a:endParaRPr>
+          </a:p>
+        </p:txBody>
+      </p:sp>
     </p:spTree>
     <p:extLst>
       <p:ext uri="{BB962C8B-B14F-4D97-AF65-F5344CB8AC3E}">
@@ -32384,7 +32477,7 @@
         </p:nvSpPr>
         <p:spPr>
           <a:xfrm>
-            <a:off x="2519889" y="1671153"/>
+            <a:off x="2779400" y="1698486"/>
             <a:ext cx="792088" cy="400110"/>
           </a:xfrm>
           <a:prstGeom prst="rect">
@@ -32424,7 +32517,7 @@
         </p:nvSpPr>
         <p:spPr>
           <a:xfrm>
-            <a:off x="8782565" y="1670881"/>
+            <a:off x="8522641" y="1698486"/>
             <a:ext cx="792088" cy="400110"/>
           </a:xfrm>
           <a:prstGeom prst="rect">
@@ -32472,7 +32565,7 @@
         </p:blipFill>
         <p:spPr>
           <a:xfrm>
-            <a:off x="6816080" y="2223443"/>
+            <a:off x="6556156" y="2223443"/>
             <a:ext cx="4725059" cy="2991267"/>
           </a:xfrm>
           <a:prstGeom prst="rect">
@@ -32502,7 +32595,7 @@
         </p:blipFill>
         <p:spPr>
           <a:xfrm>
-            <a:off x="548640" y="2223442"/>
+            <a:off x="910785" y="2223443"/>
             <a:ext cx="4734586" cy="2991267"/>
           </a:xfrm>
           <a:prstGeom prst="rect">
@@ -32510,6 +32603,142 @@
           </a:prstGeom>
         </p:spPr>
       </p:pic>
+      <p:sp>
+        <p:nvSpPr>
+          <p:cNvPr id="7" name="TextBox 6">
+            <a:extLst>
+              <a:ext uri="{FF2B5EF4-FFF2-40B4-BE49-F238E27FC236}">
+                <a16:creationId xmlns:a16="http://schemas.microsoft.com/office/drawing/2014/main" id="{160D45F6-AAB1-8297-BBEB-F9F0D0E35DE4}"/>
+              </a:ext>
+            </a:extLst>
+          </p:cNvPr>
+          <p:cNvSpPr txBox="1"/>
+          <p:nvPr/>
+        </p:nvSpPr>
+        <p:spPr>
+          <a:xfrm>
+            <a:off x="509776" y="5516174"/>
+            <a:ext cx="5331336" cy="646331"/>
+          </a:xfrm>
+          <a:prstGeom prst="rect">
+            <a:avLst/>
+          </a:prstGeom>
+          <a:noFill/>
+        </p:spPr>
+        <p:txBody>
+          <a:bodyPr wrap="square">
+            <a:spAutoFit/>
+          </a:bodyPr>
+          <a:lstStyle/>
+          <a:p>
+            <a:pPr marL="285750" indent="-285750">
+              <a:buFont typeface="Wingdings" panose="05000000000000000000" pitchFamily="2" charset="2"/>
+              <a:buChar char="Ø"/>
+            </a:pPr>
+            <a:r>
+              <a:rPr lang="en-US" dirty="0">
+                <a:solidFill>
+                  <a:schemeClr val="accent1"/>
+                </a:solidFill>
+              </a:rPr>
+              <a:t>The most purchased product was </a:t>
+            </a:r>
+            <a:r>
+              <a:rPr lang="en-US" b="1" dirty="0" err="1">
+                <a:solidFill>
+                  <a:schemeClr val="accent1"/>
+                </a:solidFill>
+              </a:rPr>
+              <a:t>skywalker</a:t>
+            </a:r>
+            <a:r>
+              <a:rPr lang="en-US" b="1" dirty="0">
+                <a:solidFill>
+                  <a:schemeClr val="accent1"/>
+                </a:solidFill>
+              </a:rPr>
+              <a:t> </a:t>
+            </a:r>
+            <a:r>
+              <a:rPr lang="en-US" b="1" dirty="0" err="1">
+                <a:solidFill>
+                  <a:schemeClr val="accent1"/>
+                </a:solidFill>
+              </a:rPr>
+              <a:t>ewok</a:t>
+            </a:r>
+            <a:r>
+              <a:rPr lang="en-US" b="1" dirty="0">
+                <a:solidFill>
+                  <a:schemeClr val="accent1"/>
+                </a:solidFill>
+              </a:rPr>
+              <a:t> </a:t>
+            </a:r>
+            <a:r>
+              <a:rPr lang="en-US" dirty="0">
+                <a:solidFill>
+                  <a:schemeClr val="accent1"/>
+                </a:solidFill>
+              </a:rPr>
+              <a:t>with a total of 7 purchases.</a:t>
+            </a:r>
+            <a:endParaRPr lang="en-GB" dirty="0">
+              <a:solidFill>
+                <a:schemeClr val="accent1"/>
+              </a:solidFill>
+            </a:endParaRPr>
+          </a:p>
+        </p:txBody>
+      </p:sp>
+      <p:sp>
+        <p:nvSpPr>
+          <p:cNvPr id="8" name="TextBox 7">
+            <a:extLst>
+              <a:ext uri="{FF2B5EF4-FFF2-40B4-BE49-F238E27FC236}">
+                <a16:creationId xmlns:a16="http://schemas.microsoft.com/office/drawing/2014/main" id="{E500E949-48D5-4EB7-60F9-FB1144309BC5}"/>
+              </a:ext>
+            </a:extLst>
+          </p:cNvPr>
+          <p:cNvSpPr txBox="1"/>
+          <p:nvPr/>
+        </p:nvSpPr>
+        <p:spPr>
+          <a:xfrm>
+            <a:off x="6350888" y="5501640"/>
+            <a:ext cx="5331336" cy="365760"/>
+          </a:xfrm>
+          <a:prstGeom prst="rect">
+            <a:avLst/>
+          </a:prstGeom>
+          <a:noFill/>
+        </p:spPr>
+        <p:txBody>
+          <a:bodyPr wrap="square">
+            <a:spAutoFit/>
+          </a:bodyPr>
+          <a:lstStyle/>
+          <a:p>
+            <a:pPr marL="285750" indent="-285750">
+              <a:buFont typeface="Wingdings" panose="05000000000000000000" pitchFamily="2" charset="2"/>
+              <a:buChar char="Ø"/>
+            </a:pPr>
+            <a:r>
+              <a:rPr lang="en-US" dirty="0">
+                <a:solidFill>
+                  <a:schemeClr val="accent1"/>
+                </a:solidFill>
+              </a:rPr>
+              <a:t>6 products were purchased only once.</a:t>
+            </a:r>
+            <a:endParaRPr lang="en-GB" dirty="0">
+              <a:solidFill>
+                <a:schemeClr val="accent1"/>
+              </a:solidFill>
+            </a:endParaRPr>
+          </a:p>
+        </p:txBody>
+      </p:sp>
     </p:spTree>
     <p:extLst>
       <p:ext uri="{BB962C8B-B14F-4D97-AF65-F5344CB8AC3E}">
@@ -33318,24 +33547,6 @@
 </file>
 
 <file path=customXml/item1.xml><?xml version="1.0" encoding="utf-8"?>
-<p:properties xmlns:p="http://schemas.microsoft.com/office/2006/metadata/properties" xmlns:xsi="http://www.w3.org/2001/XMLSchema-instance" xmlns:pc="http://schemas.microsoft.com/office/infopath/2007/PartnerControls">
-  <documentManagement>
-    <Status xmlns="71af3243-3dd4-4a8d-8c0d-dd76da1f02a5">Not started</Status>
-    <MediaServiceKeyPoints xmlns="71af3243-3dd4-4a8d-8c0d-dd76da1f02a5" xsi:nil="true"/>
-  </documentManagement>
-</p:properties>
-</file>
-
-<file path=customXml/item2.xml><?xml version="1.0" encoding="utf-8"?>
-<?mso-contentType ?>
-<FormTemplates xmlns="http://schemas.microsoft.com/sharepoint/v3/contenttype/forms">
-  <Display>DocumentLibraryForm</Display>
-  <Edit>DocumentLibraryForm</Edit>
-  <New>DocumentLibraryForm</New>
-</FormTemplates>
-</file>
-
-<file path=customXml/item3.xml><?xml version="1.0" encoding="utf-8"?>
 <ct:contentTypeSchema xmlns:ct="http://schemas.microsoft.com/office/2006/metadata/contentType" xmlns:ma="http://schemas.microsoft.com/office/2006/metadata/properties/metaAttributes" ct:_="" ma:_="" ma:contentTypeName="Document" ma:contentTypeID="0x01010079F111ED35F8CC479449609E8A0923A6" ma:contentTypeVersion="12" ma:contentTypeDescription="Create a new document." ma:contentTypeScope="" ma:versionID="f9fc9171bb41dc08635275f351de8590">
   <xsd:schema xmlns:xsd="http://www.w3.org/2001/XMLSchema" xmlns:xs="http://www.w3.org/2001/XMLSchema" xmlns:p="http://schemas.microsoft.com/office/2006/metadata/properties" xmlns:ns2="71af3243-3dd4-4a8d-8c0d-dd76da1f02a5" xmlns:ns3="16c05727-aa75-4e4a-9b5f-8a80a1165891" targetNamespace="http://schemas.microsoft.com/office/2006/metadata/properties" ma:root="true" ma:fieldsID="29387215989a890c06011de04edfe97d" ns2:_="" ns3:_="">
     <xsd:import namespace="71af3243-3dd4-4a8d-8c0d-dd76da1f02a5"/>
@@ -33556,25 +33767,25 @@
 </ct:contentTypeSchema>
 </file>
 
-<file path=customXml/itemProps1.xml><?xml version="1.0" encoding="utf-8"?>
-<ds:datastoreItem xmlns:ds="http://schemas.openxmlformats.org/officeDocument/2006/customXml" ds:itemID="{6A86D9CC-0D9D-4BFE-B3F3-26F480BF8C8A}">
-  <ds:schemaRefs>
-    <ds:schemaRef ds:uri="http://schemas.microsoft.com/office/2006/metadata/properties"/>
-    <ds:schemaRef ds:uri="http://schemas.microsoft.com/office/infopath/2007/PartnerControls"/>
-    <ds:schemaRef ds:uri="71af3243-3dd4-4a8d-8c0d-dd76da1f02a5"/>
-  </ds:schemaRefs>
-</ds:datastoreItem>
+<file path=customXml/item2.xml><?xml version="1.0" encoding="utf-8"?>
+<?mso-contentType ?>
+<FormTemplates xmlns="http://schemas.microsoft.com/sharepoint/v3/contenttype/forms">
+  <Display>DocumentLibraryForm</Display>
+  <Edit>DocumentLibraryForm</Edit>
+  <New>DocumentLibraryForm</New>
+</FormTemplates>
 </file>
 
-<file path=customXml/itemProps2.xml><?xml version="1.0" encoding="utf-8"?>
-<ds:datastoreItem xmlns:ds="http://schemas.openxmlformats.org/officeDocument/2006/customXml" ds:itemID="{8106BD98-E608-40A1-98A8-93D5976215CA}">
-  <ds:schemaRefs>
-    <ds:schemaRef ds:uri="http://schemas.microsoft.com/sharepoint/v3/contenttype/forms"/>
-  </ds:schemaRefs>
-</ds:datastoreItem>
+<file path=customXml/item3.xml><?xml version="1.0" encoding="utf-8"?>
+<p:properties xmlns:p="http://schemas.microsoft.com/office/2006/metadata/properties" xmlns:xsi="http://www.w3.org/2001/XMLSchema-instance" xmlns:pc="http://schemas.microsoft.com/office/infopath/2007/PartnerControls">
+  <documentManagement>
+    <Status xmlns="71af3243-3dd4-4a8d-8c0d-dd76da1f02a5">Not started</Status>
+    <MediaServiceKeyPoints xmlns="71af3243-3dd4-4a8d-8c0d-dd76da1f02a5" xsi:nil="true"/>
+  </documentManagement>
+</p:properties>
 </file>
 
-<file path=customXml/itemProps3.xml><?xml version="1.0" encoding="utf-8"?>
+<file path=customXml/itemProps1.xml><?xml version="1.0" encoding="utf-8"?>
 <ds:datastoreItem xmlns:ds="http://schemas.openxmlformats.org/officeDocument/2006/customXml" ds:itemID="{9BFCA5F6-1A5A-4D78-BDE2-C793B61E0E12}">
   <ds:schemaRefs>
     <ds:schemaRef ds:uri="http://schemas.microsoft.com/office/2006/metadata/contentType"/>
@@ -33591,4 +33802,22 @@
     <ds:schemaRef ds:uri="http://schemas.microsoft.com/internal/obd"/>
   </ds:schemaRefs>
 </ds:datastoreItem>
+</file>
+
+<file path=customXml/itemProps2.xml><?xml version="1.0" encoding="utf-8"?>
+<ds:datastoreItem xmlns:ds="http://schemas.openxmlformats.org/officeDocument/2006/customXml" ds:itemID="{8106BD98-E608-40A1-98A8-93D5976215CA}">
+  <ds:schemaRefs>
+    <ds:schemaRef ds:uri="http://schemas.microsoft.com/sharepoint/v3/contenttype/forms"/>
+  </ds:schemaRefs>
+</ds:datastoreItem>
+</file>
+
+<file path=customXml/itemProps3.xml><?xml version="1.0" encoding="utf-8"?>
+<ds:datastoreItem xmlns:ds="http://schemas.openxmlformats.org/officeDocument/2006/customXml" ds:itemID="{6A86D9CC-0D9D-4BFE-B3F3-26F480BF8C8A}">
+  <ds:schemaRefs>
+    <ds:schemaRef ds:uri="http://schemas.microsoft.com/office/2006/metadata/properties"/>
+    <ds:schemaRef ds:uri="http://schemas.microsoft.com/office/infopath/2007/PartnerControls"/>
+    <ds:schemaRef ds:uri="71af3243-3dd4-4a8d-8c0d-dd76da1f02a5"/>
+  </ds:schemaRefs>
+</ds:datastoreItem>
 </file>
</xml_diff>